<commit_message>
opdatering af design billeder
</commit_message>
<xml_diff>
--- a/Diagrammer/CC-App_design/CC_App_Vinduer.pptx
+++ b/Diagrammer/CC-App_design/CC_App_Vinduer.pptx
@@ -206,7 +206,7 @@
           <a:p>
             <a:fld id="{9B123F91-F4A3-4DE7-98F5-321C0B3DDF78}" type="datetimeFigureOut">
               <a:rPr lang="da-DK" smtClean="0"/>
-              <a:t>14-10-2021</a:t>
+              <a:t>04-11-2021</a:t>
             </a:fld>
             <a:endParaRPr lang="da-DK"/>
           </a:p>
@@ -993,7 +993,7 @@
           <a:p>
             <a:fld id="{283C4389-C94E-476A-A06A-DD68FB615506}" type="datetimeFigureOut">
               <a:rPr lang="da-DK" smtClean="0"/>
-              <a:t>14-10-2021</a:t>
+              <a:t>04-11-2021</a:t>
             </a:fld>
             <a:endParaRPr lang="da-DK"/>
           </a:p>
@@ -1191,7 +1191,7 @@
           <a:p>
             <a:fld id="{283C4389-C94E-476A-A06A-DD68FB615506}" type="datetimeFigureOut">
               <a:rPr lang="da-DK" smtClean="0"/>
-              <a:t>14-10-2021</a:t>
+              <a:t>04-11-2021</a:t>
             </a:fld>
             <a:endParaRPr lang="da-DK"/>
           </a:p>
@@ -1399,7 +1399,7 @@
           <a:p>
             <a:fld id="{283C4389-C94E-476A-A06A-DD68FB615506}" type="datetimeFigureOut">
               <a:rPr lang="da-DK" smtClean="0"/>
-              <a:t>14-10-2021</a:t>
+              <a:t>04-11-2021</a:t>
             </a:fld>
             <a:endParaRPr lang="da-DK"/>
           </a:p>
@@ -1597,7 +1597,7 @@
           <a:p>
             <a:fld id="{283C4389-C94E-476A-A06A-DD68FB615506}" type="datetimeFigureOut">
               <a:rPr lang="da-DK" smtClean="0"/>
-              <a:t>14-10-2021</a:t>
+              <a:t>04-11-2021</a:t>
             </a:fld>
             <a:endParaRPr lang="da-DK"/>
           </a:p>
@@ -1872,7 +1872,7 @@
           <a:p>
             <a:fld id="{283C4389-C94E-476A-A06A-DD68FB615506}" type="datetimeFigureOut">
               <a:rPr lang="da-DK" smtClean="0"/>
-              <a:t>14-10-2021</a:t>
+              <a:t>04-11-2021</a:t>
             </a:fld>
             <a:endParaRPr lang="da-DK"/>
           </a:p>
@@ -2137,7 +2137,7 @@
           <a:p>
             <a:fld id="{283C4389-C94E-476A-A06A-DD68FB615506}" type="datetimeFigureOut">
               <a:rPr lang="da-DK" smtClean="0"/>
-              <a:t>14-10-2021</a:t>
+              <a:t>04-11-2021</a:t>
             </a:fld>
             <a:endParaRPr lang="da-DK"/>
           </a:p>
@@ -2549,7 +2549,7 @@
           <a:p>
             <a:fld id="{283C4389-C94E-476A-A06A-DD68FB615506}" type="datetimeFigureOut">
               <a:rPr lang="da-DK" smtClean="0"/>
-              <a:t>14-10-2021</a:t>
+              <a:t>04-11-2021</a:t>
             </a:fld>
             <a:endParaRPr lang="da-DK"/>
           </a:p>
@@ -2690,7 +2690,7 @@
           <a:p>
             <a:fld id="{283C4389-C94E-476A-A06A-DD68FB615506}" type="datetimeFigureOut">
               <a:rPr lang="da-DK" smtClean="0"/>
-              <a:t>14-10-2021</a:t>
+              <a:t>04-11-2021</a:t>
             </a:fld>
             <a:endParaRPr lang="da-DK"/>
           </a:p>
@@ -2803,7 +2803,7 @@
           <a:p>
             <a:fld id="{283C4389-C94E-476A-A06A-DD68FB615506}" type="datetimeFigureOut">
               <a:rPr lang="da-DK" smtClean="0"/>
-              <a:t>14-10-2021</a:t>
+              <a:t>04-11-2021</a:t>
             </a:fld>
             <a:endParaRPr lang="da-DK"/>
           </a:p>
@@ -3114,7 +3114,7 @@
           <a:p>
             <a:fld id="{283C4389-C94E-476A-A06A-DD68FB615506}" type="datetimeFigureOut">
               <a:rPr lang="da-DK" smtClean="0"/>
-              <a:t>14-10-2021</a:t>
+              <a:t>04-11-2021</a:t>
             </a:fld>
             <a:endParaRPr lang="da-DK"/>
           </a:p>
@@ -3402,7 +3402,7 @@
           <a:p>
             <a:fld id="{283C4389-C94E-476A-A06A-DD68FB615506}" type="datetimeFigureOut">
               <a:rPr lang="da-DK" smtClean="0"/>
-              <a:t>14-10-2021</a:t>
+              <a:t>04-11-2021</a:t>
             </a:fld>
             <a:endParaRPr lang="da-DK"/>
           </a:p>
@@ -3643,7 +3643,7 @@
           <a:p>
             <a:fld id="{283C4389-C94E-476A-A06A-DD68FB615506}" type="datetimeFigureOut">
               <a:rPr lang="da-DK" smtClean="0"/>
-              <a:t>14-10-2021</a:t>
+              <a:t>04-11-2021</a:t>
             </a:fld>
             <a:endParaRPr lang="da-DK"/>
           </a:p>
@@ -5138,18 +5138,30 @@
           <a:p>
             <a:pPr algn="ctr"/>
             <a:r>
-              <a:rPr lang="da-DK" sz="1400" dirty="0"/>
+              <a:rPr lang="da-DK" sz="1400" dirty="0">
+                <a:solidFill>
+                  <a:srgbClr val="FF0000"/>
+                </a:solidFill>
+              </a:rPr>
               <a:t>Brugernavn og/eller password findes ikke!</a:t>
             </a:r>
           </a:p>
           <a:p>
             <a:pPr algn="ctr"/>
-            <a:endParaRPr lang="da-DK" sz="1400" dirty="0"/>
+            <a:endParaRPr lang="da-DK" sz="1400" dirty="0">
+              <a:solidFill>
+                <a:srgbClr val="FF0000"/>
+              </a:solidFill>
+            </a:endParaRPr>
           </a:p>
           <a:p>
             <a:pPr algn="ctr"/>
             <a:r>
-              <a:rPr lang="da-DK" sz="1400" dirty="0"/>
+              <a:rPr lang="da-DK" sz="1400" dirty="0">
+                <a:solidFill>
+                  <a:srgbClr val="FF0000"/>
+                </a:solidFill>
+              </a:rPr>
               <a:t>Kontroller venligst at korrekte oplysninger er indtastet eller opret en bruger</a:t>
             </a:r>
           </a:p>
@@ -6713,7 +6725,7 @@
         <p:spPr>
           <a:xfrm>
             <a:off x="6783540" y="1442070"/>
-            <a:ext cx="1617302" cy="646331"/>
+            <a:ext cx="1708673" cy="646331"/>
           </a:xfrm>
           <a:prstGeom prst="rect">
             <a:avLst/>
@@ -6727,9 +6739,10 @@
           <a:lstStyle/>
           <a:p>
             <a:r>
-              <a:rPr lang="da-DK" sz="1800" b="1" dirty="0"/>
-              <a:t>Mine pubcrawl</a:t>
-            </a:r>
+              <a:rPr lang="da-DK" sz="1800" b="1"/>
+              <a:t>Mine pubcrawls</a:t>
+            </a:r>
+            <a:endParaRPr lang="da-DK" sz="1800" b="1" dirty="0"/>
           </a:p>
           <a:p>
             <a:endParaRPr lang="da-DK" dirty="0"/>

</xml_diff>

<commit_message>
powerpointer for CC App er rettet til
</commit_message>
<xml_diff>
--- a/Diagrammer/CC-App_design/CC_App_Vinduer.pptx
+++ b/Diagrammer/CC-App_design/CC_App_Vinduer.pptx
@@ -206,7 +206,7 @@
           <a:p>
             <a:fld id="{9B123F91-F4A3-4DE7-98F5-321C0B3DDF78}" type="datetimeFigureOut">
               <a:rPr lang="da-DK" smtClean="0"/>
-              <a:t>04-11-2021</a:t>
+              <a:t>11-11-2021</a:t>
             </a:fld>
             <a:endParaRPr lang="da-DK"/>
           </a:p>
@@ -993,7 +993,7 @@
           <a:p>
             <a:fld id="{283C4389-C94E-476A-A06A-DD68FB615506}" type="datetimeFigureOut">
               <a:rPr lang="da-DK" smtClean="0"/>
-              <a:t>04-11-2021</a:t>
+              <a:t>11-11-2021</a:t>
             </a:fld>
             <a:endParaRPr lang="da-DK"/>
           </a:p>
@@ -1191,7 +1191,7 @@
           <a:p>
             <a:fld id="{283C4389-C94E-476A-A06A-DD68FB615506}" type="datetimeFigureOut">
               <a:rPr lang="da-DK" smtClean="0"/>
-              <a:t>04-11-2021</a:t>
+              <a:t>11-11-2021</a:t>
             </a:fld>
             <a:endParaRPr lang="da-DK"/>
           </a:p>
@@ -1399,7 +1399,7 @@
           <a:p>
             <a:fld id="{283C4389-C94E-476A-A06A-DD68FB615506}" type="datetimeFigureOut">
               <a:rPr lang="da-DK" smtClean="0"/>
-              <a:t>04-11-2021</a:t>
+              <a:t>11-11-2021</a:t>
             </a:fld>
             <a:endParaRPr lang="da-DK"/>
           </a:p>
@@ -1597,7 +1597,7 @@
           <a:p>
             <a:fld id="{283C4389-C94E-476A-A06A-DD68FB615506}" type="datetimeFigureOut">
               <a:rPr lang="da-DK" smtClean="0"/>
-              <a:t>04-11-2021</a:t>
+              <a:t>11-11-2021</a:t>
             </a:fld>
             <a:endParaRPr lang="da-DK"/>
           </a:p>
@@ -1872,7 +1872,7 @@
           <a:p>
             <a:fld id="{283C4389-C94E-476A-A06A-DD68FB615506}" type="datetimeFigureOut">
               <a:rPr lang="da-DK" smtClean="0"/>
-              <a:t>04-11-2021</a:t>
+              <a:t>11-11-2021</a:t>
             </a:fld>
             <a:endParaRPr lang="da-DK"/>
           </a:p>
@@ -2137,7 +2137,7 @@
           <a:p>
             <a:fld id="{283C4389-C94E-476A-A06A-DD68FB615506}" type="datetimeFigureOut">
               <a:rPr lang="da-DK" smtClean="0"/>
-              <a:t>04-11-2021</a:t>
+              <a:t>11-11-2021</a:t>
             </a:fld>
             <a:endParaRPr lang="da-DK"/>
           </a:p>
@@ -2549,7 +2549,7 @@
           <a:p>
             <a:fld id="{283C4389-C94E-476A-A06A-DD68FB615506}" type="datetimeFigureOut">
               <a:rPr lang="da-DK" smtClean="0"/>
-              <a:t>04-11-2021</a:t>
+              <a:t>11-11-2021</a:t>
             </a:fld>
             <a:endParaRPr lang="da-DK"/>
           </a:p>
@@ -2690,7 +2690,7 @@
           <a:p>
             <a:fld id="{283C4389-C94E-476A-A06A-DD68FB615506}" type="datetimeFigureOut">
               <a:rPr lang="da-DK" smtClean="0"/>
-              <a:t>04-11-2021</a:t>
+              <a:t>11-11-2021</a:t>
             </a:fld>
             <a:endParaRPr lang="da-DK"/>
           </a:p>
@@ -2803,7 +2803,7 @@
           <a:p>
             <a:fld id="{283C4389-C94E-476A-A06A-DD68FB615506}" type="datetimeFigureOut">
               <a:rPr lang="da-DK" smtClean="0"/>
-              <a:t>04-11-2021</a:t>
+              <a:t>11-11-2021</a:t>
             </a:fld>
             <a:endParaRPr lang="da-DK"/>
           </a:p>
@@ -3114,7 +3114,7 @@
           <a:p>
             <a:fld id="{283C4389-C94E-476A-A06A-DD68FB615506}" type="datetimeFigureOut">
               <a:rPr lang="da-DK" smtClean="0"/>
-              <a:t>04-11-2021</a:t>
+              <a:t>11-11-2021</a:t>
             </a:fld>
             <a:endParaRPr lang="da-DK"/>
           </a:p>
@@ -3402,7 +3402,7 @@
           <a:p>
             <a:fld id="{283C4389-C94E-476A-A06A-DD68FB615506}" type="datetimeFigureOut">
               <a:rPr lang="da-DK" smtClean="0"/>
-              <a:t>04-11-2021</a:t>
+              <a:t>11-11-2021</a:t>
             </a:fld>
             <a:endParaRPr lang="da-DK"/>
           </a:p>
@@ -3643,7 +3643,7 @@
           <a:p>
             <a:fld id="{283C4389-C94E-476A-A06A-DD68FB615506}" type="datetimeFigureOut">
               <a:rPr lang="da-DK" smtClean="0"/>
-              <a:t>04-11-2021</a:t>
+              <a:t>11-11-2021</a:t>
             </a:fld>
             <a:endParaRPr lang="da-DK"/>
           </a:p>
@@ -4932,8 +4932,8 @@
         </p:nvSpPr>
         <p:spPr>
           <a:xfrm>
-            <a:off x="3391814" y="591266"/>
-            <a:ext cx="4532883" cy="2887579"/>
+            <a:off x="3391814" y="591267"/>
+            <a:ext cx="4532883" cy="2571320"/>
           </a:xfrm>
           <a:prstGeom prst="rect">
             <a:avLst/>
@@ -4979,7 +4979,7 @@
         </p:nvSpPr>
         <p:spPr>
           <a:xfrm>
-            <a:off x="4001386" y="2709162"/>
+            <a:off x="4936385" y="2317277"/>
             <a:ext cx="1333787" cy="405636"/>
           </a:xfrm>
           <a:prstGeom prst="rect">
@@ -5123,7 +5123,7 @@
         <p:spPr>
           <a:xfrm>
             <a:off x="3513222" y="1258159"/>
-            <a:ext cx="4180114" cy="954107"/>
+            <a:ext cx="4180114" cy="738664"/>
           </a:xfrm>
           <a:prstGeom prst="rect">
             <a:avLst/>
@@ -5162,58 +5162,21 @@
                   <a:srgbClr val="FF0000"/>
                 </a:solidFill>
               </a:rPr>
-              <a:t>Kontroller venligst at korrekte oplysninger er indtastet eller opret en bruger</a:t>
-            </a:r>
-          </a:p>
-        </p:txBody>
-      </p:sp>
-      <p:sp>
-        <p:nvSpPr>
-          <p:cNvPr id="10" name="Rektangel 9">
-            <a:extLst>
-              <a:ext uri="{FF2B5EF4-FFF2-40B4-BE49-F238E27FC236}">
-                <a16:creationId xmlns:a16="http://schemas.microsoft.com/office/drawing/2014/main" id="{77E7A1C7-542C-4DD1-8C64-68717399FA47}"/>
-              </a:ext>
-            </a:extLst>
-          </p:cNvPr>
-          <p:cNvSpPr/>
-          <p:nvPr/>
-        </p:nvSpPr>
-        <p:spPr>
-          <a:xfrm>
-            <a:off x="5944745" y="2709162"/>
-            <a:ext cx="1333787" cy="405636"/>
-          </a:xfrm>
-          <a:prstGeom prst="rect">
-            <a:avLst/>
-          </a:prstGeom>
-          <a:solidFill>
-            <a:srgbClr val="DCA2F6"/>
-          </a:solidFill>
-        </p:spPr>
-        <p:style>
-          <a:lnRef idx="2">
-            <a:schemeClr val="dk1"/>
-          </a:lnRef>
-          <a:fillRef idx="1">
-            <a:schemeClr val="lt1"/>
-          </a:fillRef>
-          <a:effectRef idx="0">
-            <a:schemeClr val="dk1"/>
-          </a:effectRef>
-          <a:fontRef idx="minor">
-            <a:schemeClr val="dk1"/>
-          </a:fontRef>
-        </p:style>
-        <p:txBody>
-          <a:bodyPr rtlCol="0" anchor="ctr"/>
-          <a:lstStyle/>
-          <a:p>
-            <a:pPr algn="ctr"/>
-            <a:r>
-              <a:rPr lang="da-DK" sz="1400" b="1" dirty="0"/>
-              <a:t>Opret bruger</a:t>
-            </a:r>
+              <a:t>Kontroller venligst at korrekte oplysninger </a:t>
+            </a:r>
+            <a:r>
+              <a:rPr lang="da-DK" sz="1400">
+                <a:solidFill>
+                  <a:srgbClr val="FF0000"/>
+                </a:solidFill>
+              </a:rPr>
+              <a:t>er indtastet</a:t>
+            </a:r>
+            <a:endParaRPr lang="da-DK" sz="1400" dirty="0">
+              <a:solidFill>
+                <a:srgbClr val="FF0000"/>
+              </a:solidFill>
+            </a:endParaRPr>
           </a:p>
         </p:txBody>
       </p:sp>
@@ -6325,41 +6288,6 @@
       </p:sp>
       <p:sp>
         <p:nvSpPr>
-          <p:cNvPr id="17" name="Tekstfelt 16">
-            <a:extLst>
-              <a:ext uri="{FF2B5EF4-FFF2-40B4-BE49-F238E27FC236}">
-                <a16:creationId xmlns:a16="http://schemas.microsoft.com/office/drawing/2014/main" id="{D8AA355A-1381-444B-96F2-D5DA61CF7076}"/>
-              </a:ext>
-            </a:extLst>
-          </p:cNvPr>
-          <p:cNvSpPr txBox="1"/>
-          <p:nvPr/>
-        </p:nvSpPr>
-        <p:spPr>
-          <a:xfrm>
-            <a:off x="211444" y="1288182"/>
-            <a:ext cx="1438151" cy="307777"/>
-          </a:xfrm>
-          <a:prstGeom prst="rect">
-            <a:avLst/>
-          </a:prstGeom>
-          <a:noFill/>
-        </p:spPr>
-        <p:txBody>
-          <a:bodyPr wrap="none" rtlCol="0">
-            <a:spAutoFit/>
-          </a:bodyPr>
-          <a:lstStyle/>
-          <a:p>
-            <a:r>
-              <a:rPr lang="da-DK" sz="1400" dirty="0"/>
-              <a:t>Tilmeld pubcrawl</a:t>
-            </a:r>
-          </a:p>
-        </p:txBody>
-      </p:sp>
-      <p:sp>
-        <p:nvSpPr>
           <p:cNvPr id="18" name="Rektangel 17">
             <a:extLst>
               <a:ext uri="{FF2B5EF4-FFF2-40B4-BE49-F238E27FC236}">
@@ -6426,8 +6354,8 @@
         </p:nvSpPr>
         <p:spPr>
           <a:xfrm>
-            <a:off x="517425" y="883350"/>
-            <a:ext cx="826188" cy="307777"/>
+            <a:off x="220555" y="903493"/>
+            <a:ext cx="1438151" cy="523220"/>
           </a:xfrm>
           <a:prstGeom prst="rect">
             <a:avLst/>
@@ -6441,9 +6369,12 @@
           <a:lstStyle/>
           <a:p>
             <a:r>
-              <a:rPr lang="da-DK" sz="1400" dirty="0"/>
-              <a:t>Vis profil</a:t>
-            </a:r>
+              <a:rPr lang="da-DK" sz="1400"/>
+              <a:t>Tilmeld pubcrawl</a:t>
+            </a:r>
+          </a:p>
+          <a:p>
+            <a:endParaRPr lang="da-DK" sz="1400" dirty="0"/>
           </a:p>
         </p:txBody>
       </p:sp>
@@ -6746,6 +6677,42 @@
           </a:p>
           <a:p>
             <a:endParaRPr lang="da-DK" dirty="0"/>
+          </a:p>
+        </p:txBody>
+      </p:sp>
+      <p:sp>
+        <p:nvSpPr>
+          <p:cNvPr id="3" name="Tekstfelt 2">
+            <a:extLst>
+              <a:ext uri="{FF2B5EF4-FFF2-40B4-BE49-F238E27FC236}">
+                <a16:creationId xmlns:a16="http://schemas.microsoft.com/office/drawing/2014/main" id="{B05D3243-D5B5-4CF4-8140-B7492EFE4DBB}"/>
+              </a:ext>
+            </a:extLst>
+          </p:cNvPr>
+          <p:cNvSpPr txBox="1"/>
+          <p:nvPr/>
+        </p:nvSpPr>
+        <p:spPr>
+          <a:xfrm>
+            <a:off x="596133" y="1295377"/>
+            <a:ext cx="668773" cy="307777"/>
+          </a:xfrm>
+          <a:prstGeom prst="rect">
+            <a:avLst/>
+          </a:prstGeom>
+          <a:noFill/>
+        </p:spPr>
+        <p:txBody>
+          <a:bodyPr wrap="none" rtlCol="0">
+            <a:spAutoFit/>
+          </a:bodyPr>
+          <a:lstStyle/>
+          <a:p>
+            <a:r>
+              <a:rPr lang="en-US" sz="1400"/>
+              <a:t>Log ud</a:t>
+            </a:r>
+            <a:endParaRPr lang="da-DK" sz="1400"/>
           </a:p>
         </p:txBody>
       </p:sp>
@@ -7179,8 +7146,8 @@
         </p:nvSpPr>
         <p:spPr>
           <a:xfrm>
-            <a:off x="211444" y="1288182"/>
-            <a:ext cx="1438151" cy="307777"/>
+            <a:off x="596132" y="1288182"/>
+            <a:ext cx="668773" cy="307777"/>
           </a:xfrm>
           <a:prstGeom prst="rect">
             <a:avLst/>
@@ -7194,9 +7161,14 @@
           <a:lstStyle/>
           <a:p>
             <a:r>
-              <a:rPr lang="da-DK" sz="1400" dirty="0"/>
-              <a:t>Tilmeld pubcrawl</a:t>
-            </a:r>
+              <a:rPr lang="en-US" sz="1400"/>
+              <a:t>L</a:t>
+            </a:r>
+            <a:r>
+              <a:rPr lang="da-DK" sz="1400"/>
+              <a:t>og ud</a:t>
+            </a:r>
+            <a:endParaRPr lang="da-DK" sz="1400" dirty="0"/>
           </a:p>
         </p:txBody>
       </p:sp>

</xml_diff>